<commit_message>
Render script update production
</commit_message>
<xml_diff>
--- a/presentations/output_presentation.pptx
+++ b/presentations/output_presentation.pptx
@@ -11,19 +11,6 @@
     <p:sldId id="259" r:id="rId10"/>
     <p:sldId id="260" r:id="rId11"/>
     <p:sldId id="261" r:id="rId12"/>
-    <p:sldId id="262" r:id="rId13"/>
-    <p:sldId id="263" r:id="rId14"/>
-    <p:sldId id="264" r:id="rId15"/>
-    <p:sldId id="265" r:id="rId16"/>
-    <p:sldId id="266" r:id="rId17"/>
-    <p:sldId id="267" r:id="rId18"/>
-    <p:sldId id="268" r:id="rId19"/>
-    <p:sldId id="269" r:id="rId20"/>
-    <p:sldId id="270" r:id="rId21"/>
-    <p:sldId id="271" r:id="rId22"/>
-    <p:sldId id="272" r:id="rId23"/>
-    <p:sldId id="273" r:id="rId24"/>
-    <p:sldId id="274" r:id="rId25"/>
   </p:sldIdLst>
   <p:sldSz cx="9144000" cy="6858000" type="screen4x3"/>
   <p:notesSz cx="6858000" cy="9144000"/>
@@ -3241,1616 +3228,6 @@
 </p:sld>
 </file>
 
-<file path=ppt/slides/slide10.xml><?xml version="1.0" encoding="utf-8"?>
-<p:sld xmlns:a="http://schemas.openxmlformats.org/drawingml/2006/main" xmlns:p="http://schemas.openxmlformats.org/presentationml/2006/main" xmlns:r="http://schemas.openxmlformats.org/officeDocument/2006/relationships">
-  <p:cSld>
-    <p:spTree>
-      <p:nvGrpSpPr>
-        <p:cNvPr id="1" name=""/>
-        <p:cNvGrpSpPr/>
-        <p:nvPr/>
-      </p:nvGrpSpPr>
-      <p:grpSpPr/>
-      <p:sp>
-        <p:nvSpPr>
-          <p:cNvPr id="2" name="Title 1"/>
-          <p:cNvSpPr>
-            <a:spLocks noGrp="1"/>
-          </p:cNvSpPr>
-          <p:nvPr>
-            <p:ph type="title"/>
-          </p:nvPr>
-        </p:nvSpPr>
-        <p:spPr/>
-        <p:txBody>
-          <a:bodyPr/>
-          <a:lstStyle/>
-          <a:p>
-            <a:r>
-              <a:t>DPO Impact</a:t>
-            </a:r>
-          </a:p>
-        </p:txBody>
-      </p:sp>
-      <p:pic>
-        <p:nvPicPr>
-          <p:cNvPr id="3" name="Picture 2" descr="DPO Impact.png"/>
-          <p:cNvPicPr>
-            <a:picLocks noChangeAspect="1"/>
-          </p:cNvPicPr>
-          <p:nvPr/>
-        </p:nvPicPr>
-        <p:blipFill>
-          <a:blip r:embed="rId2"/>
-          <a:stretch>
-            <a:fillRect/>
-          </a:stretch>
-        </p:blipFill>
-        <p:spPr>
-          <a:xfrm>
-            <a:off x="914400" y="1371600"/>
-            <a:ext cx="4187568" cy="4572000"/>
-          </a:xfrm>
-          <a:prstGeom prst="rect">
-            <a:avLst/>
-          </a:prstGeom>
-        </p:spPr>
-      </p:pic>
-      <p:pic>
-        <p:nvPicPr>
-          <p:cNvPr id="4" name="Picture 3" descr="taulia-logo.png"/>
-          <p:cNvPicPr>
-            <a:picLocks noChangeAspect="1"/>
-          </p:cNvPicPr>
-          <p:nvPr/>
-        </p:nvPicPr>
-        <p:blipFill>
-          <a:blip r:embed="rId3"/>
-          <a:stretch>
-            <a:fillRect/>
-          </a:stretch>
-        </p:blipFill>
-        <p:spPr>
-          <a:xfrm>
-            <a:off x="7315200" y="365760"/>
-            <a:ext cx="1050029" cy="274320"/>
-          </a:xfrm>
-          <a:prstGeom prst="rect">
-            <a:avLst/>
-          </a:prstGeom>
-        </p:spPr>
-      </p:pic>
-      <p:sp>
-        <p:nvSpPr>
-          <p:cNvPr id="5" name="TextBox 4"/>
-          <p:cNvSpPr txBox="1"/>
-          <p:nvPr/>
-        </p:nvSpPr>
-        <p:spPr>
-          <a:xfrm>
-            <a:off x="457200" y="6656832"/>
-            <a:ext cx="4114800" cy="457200"/>
-          </a:xfrm>
-          <a:prstGeom prst="rect">
-            <a:avLst/>
-          </a:prstGeom>
-          <a:noFill/>
-        </p:spPr>
-        <p:txBody>
-          <a:bodyPr wrap="none">
-            <a:spAutoFit/>
-          </a:bodyPr>
-          <a:lstStyle/>
-          <a:p>
-            <a:pPr algn="l">
-              <a:defRPr sz="1000"/>
-            </a:pPr>
-            <a:r>
-              <a:t>© 2023 Taulia LLC. Confidential information. Do not distribute.</a:t>
-            </a:r>
-          </a:p>
-        </p:txBody>
-      </p:sp>
-      <p:sp>
-        <p:nvSpPr>
-          <p:cNvPr id="6" name="Rectangle 5"/>
-          <p:cNvSpPr/>
-          <p:nvPr/>
-        </p:nvSpPr>
-        <p:spPr>
-          <a:xfrm>
-            <a:off x="4572000" y="6720840"/>
-            <a:ext cx="4572000" cy="137160"/>
-          </a:xfrm>
-          <a:prstGeom prst="rect">
-            <a:avLst/>
-          </a:prstGeom>
-          <a:solidFill>
-            <a:srgbClr val="FF6600"/>
-          </a:solidFill>
-          <a:ln>
-            <a:noFill/>
-          </a:ln>
-        </p:spPr>
-        <p:style>
-          <a:lnRef idx="1">
-            <a:schemeClr val="accent1"/>
-          </a:lnRef>
-          <a:fillRef idx="3">
-            <a:schemeClr val="accent1"/>
-          </a:fillRef>
-          <a:effectRef idx="2">
-            <a:schemeClr val="accent1"/>
-          </a:effectRef>
-          <a:fontRef idx="minor">
-            <a:schemeClr val="lt1"/>
-          </a:fontRef>
-        </p:style>
-        <p:txBody>
-          <a:bodyPr rtlCol="0" anchor="ctr"/>
-          <a:lstStyle/>
-          <a:p>
-            <a:pPr algn="ctr"/>
-          </a:p>
-        </p:txBody>
-      </p:sp>
-    </p:spTree>
-  </p:cSld>
-  <p:clrMapOvr>
-    <a:masterClrMapping/>
-  </p:clrMapOvr>
-</p:sld>
-</file>
-
-<file path=ppt/slides/slide11.xml><?xml version="1.0" encoding="utf-8"?>
-<p:sld xmlns:a="http://schemas.openxmlformats.org/drawingml/2006/main" xmlns:p="http://schemas.openxmlformats.org/presentationml/2006/main" xmlns:r="http://schemas.openxmlformats.org/officeDocument/2006/relationships">
-  <p:cSld>
-    <p:spTree>
-      <p:nvGrpSpPr>
-        <p:cNvPr id="1" name=""/>
-        <p:cNvGrpSpPr/>
-        <p:nvPr/>
-      </p:nvGrpSpPr>
-      <p:grpSpPr/>
-      <p:sp>
-        <p:nvSpPr>
-          <p:cNvPr id="2" name="Title 1"/>
-          <p:cNvSpPr>
-            <a:spLocks noGrp="1"/>
-          </p:cNvSpPr>
-          <p:nvPr>
-            <p:ph type="title"/>
-          </p:nvPr>
-        </p:nvSpPr>
-        <p:spPr/>
-        <p:txBody>
-          <a:bodyPr/>
-          <a:lstStyle/>
-          <a:p>
-            <a:r>
-              <a:t>Payables Concentrations</a:t>
-            </a:r>
-          </a:p>
-        </p:txBody>
-      </p:sp>
-      <p:pic>
-        <p:nvPicPr>
-          <p:cNvPr id="3" name="Picture 2" descr="Payables Concentrations.png"/>
-          <p:cNvPicPr>
-            <a:picLocks noChangeAspect="1"/>
-          </p:cNvPicPr>
-          <p:nvPr/>
-        </p:nvPicPr>
-        <p:blipFill>
-          <a:blip r:embed="rId2"/>
-          <a:stretch>
-            <a:fillRect/>
-          </a:stretch>
-        </p:blipFill>
-        <p:spPr>
-          <a:xfrm>
-            <a:off x="914400" y="1371600"/>
-            <a:ext cx="4187568" cy="4572000"/>
-          </a:xfrm>
-          <a:prstGeom prst="rect">
-            <a:avLst/>
-          </a:prstGeom>
-        </p:spPr>
-      </p:pic>
-      <p:pic>
-        <p:nvPicPr>
-          <p:cNvPr id="4" name="Picture 3" descr="taulia-logo.png"/>
-          <p:cNvPicPr>
-            <a:picLocks noChangeAspect="1"/>
-          </p:cNvPicPr>
-          <p:nvPr/>
-        </p:nvPicPr>
-        <p:blipFill>
-          <a:blip r:embed="rId3"/>
-          <a:stretch>
-            <a:fillRect/>
-          </a:stretch>
-        </p:blipFill>
-        <p:spPr>
-          <a:xfrm>
-            <a:off x="7315200" y="365760"/>
-            <a:ext cx="1050029" cy="274320"/>
-          </a:xfrm>
-          <a:prstGeom prst="rect">
-            <a:avLst/>
-          </a:prstGeom>
-        </p:spPr>
-      </p:pic>
-      <p:sp>
-        <p:nvSpPr>
-          <p:cNvPr id="5" name="TextBox 4"/>
-          <p:cNvSpPr txBox="1"/>
-          <p:nvPr/>
-        </p:nvSpPr>
-        <p:spPr>
-          <a:xfrm>
-            <a:off x="457200" y="6656832"/>
-            <a:ext cx="4114800" cy="457200"/>
-          </a:xfrm>
-          <a:prstGeom prst="rect">
-            <a:avLst/>
-          </a:prstGeom>
-          <a:noFill/>
-        </p:spPr>
-        <p:txBody>
-          <a:bodyPr wrap="none">
-            <a:spAutoFit/>
-          </a:bodyPr>
-          <a:lstStyle/>
-          <a:p>
-            <a:pPr algn="l">
-              <a:defRPr sz="1000"/>
-            </a:pPr>
-            <a:r>
-              <a:t>© 2023 Taulia LLC. Confidential information. Do not distribute.</a:t>
-            </a:r>
-          </a:p>
-        </p:txBody>
-      </p:sp>
-      <p:sp>
-        <p:nvSpPr>
-          <p:cNvPr id="6" name="Rectangle 5"/>
-          <p:cNvSpPr/>
-          <p:nvPr/>
-        </p:nvSpPr>
-        <p:spPr>
-          <a:xfrm>
-            <a:off x="4572000" y="6720840"/>
-            <a:ext cx="4572000" cy="137160"/>
-          </a:xfrm>
-          <a:prstGeom prst="rect">
-            <a:avLst/>
-          </a:prstGeom>
-          <a:solidFill>
-            <a:srgbClr val="FF6600"/>
-          </a:solidFill>
-          <a:ln>
-            <a:noFill/>
-          </a:ln>
-        </p:spPr>
-        <p:style>
-          <a:lnRef idx="1">
-            <a:schemeClr val="accent1"/>
-          </a:lnRef>
-          <a:fillRef idx="3">
-            <a:schemeClr val="accent1"/>
-          </a:fillRef>
-          <a:effectRef idx="2">
-            <a:schemeClr val="accent1"/>
-          </a:effectRef>
-          <a:fontRef idx="minor">
-            <a:schemeClr val="lt1"/>
-          </a:fontRef>
-        </p:style>
-        <p:txBody>
-          <a:bodyPr rtlCol="0" anchor="ctr"/>
-          <a:lstStyle/>
-          <a:p>
-            <a:pPr algn="ctr"/>
-          </a:p>
-        </p:txBody>
-      </p:sp>
-    </p:spTree>
-  </p:cSld>
-  <p:clrMapOvr>
-    <a:masterClrMapping/>
-  </p:clrMapOvr>
-</p:sld>
-</file>
-
-<file path=ppt/slides/slide12.xml><?xml version="1.0" encoding="utf-8"?>
-<p:sld xmlns:a="http://schemas.openxmlformats.org/drawingml/2006/main" xmlns:p="http://schemas.openxmlformats.org/presentationml/2006/main" xmlns:r="http://schemas.openxmlformats.org/officeDocument/2006/relationships">
-  <p:cSld>
-    <p:spTree>
-      <p:nvGrpSpPr>
-        <p:cNvPr id="1" name=""/>
-        <p:cNvGrpSpPr/>
-        <p:nvPr/>
-      </p:nvGrpSpPr>
-      <p:grpSpPr/>
-      <p:sp>
-        <p:nvSpPr>
-          <p:cNvPr id="2" name="Title 1"/>
-          <p:cNvSpPr>
-            <a:spLocks noGrp="1"/>
-          </p:cNvSpPr>
-          <p:nvPr>
-            <p:ph type="title"/>
-          </p:nvPr>
-        </p:nvSpPr>
-        <p:spPr/>
-        <p:txBody>
-          <a:bodyPr/>
-          <a:lstStyle/>
-          <a:p>
-            <a:r>
-              <a:t>Estimated Payables</a:t>
-            </a:r>
-          </a:p>
-        </p:txBody>
-      </p:sp>
-      <p:pic>
-        <p:nvPicPr>
-          <p:cNvPr id="3" name="Picture 2" descr="Estimated Payables.png"/>
-          <p:cNvPicPr>
-            <a:picLocks noChangeAspect="1"/>
-          </p:cNvPicPr>
-          <p:nvPr/>
-        </p:nvPicPr>
-        <p:blipFill>
-          <a:blip r:embed="rId2"/>
-          <a:stretch>
-            <a:fillRect/>
-          </a:stretch>
-        </p:blipFill>
-        <p:spPr>
-          <a:xfrm>
-            <a:off x="914400" y="1371600"/>
-            <a:ext cx="4187568" cy="4572000"/>
-          </a:xfrm>
-          <a:prstGeom prst="rect">
-            <a:avLst/>
-          </a:prstGeom>
-        </p:spPr>
-      </p:pic>
-      <p:pic>
-        <p:nvPicPr>
-          <p:cNvPr id="4" name="Picture 3" descr="taulia-logo.png"/>
-          <p:cNvPicPr>
-            <a:picLocks noChangeAspect="1"/>
-          </p:cNvPicPr>
-          <p:nvPr/>
-        </p:nvPicPr>
-        <p:blipFill>
-          <a:blip r:embed="rId3"/>
-          <a:stretch>
-            <a:fillRect/>
-          </a:stretch>
-        </p:blipFill>
-        <p:spPr>
-          <a:xfrm>
-            <a:off x="7315200" y="365760"/>
-            <a:ext cx="1050029" cy="274320"/>
-          </a:xfrm>
-          <a:prstGeom prst="rect">
-            <a:avLst/>
-          </a:prstGeom>
-        </p:spPr>
-      </p:pic>
-      <p:sp>
-        <p:nvSpPr>
-          <p:cNvPr id="5" name="TextBox 4"/>
-          <p:cNvSpPr txBox="1"/>
-          <p:nvPr/>
-        </p:nvSpPr>
-        <p:spPr>
-          <a:xfrm>
-            <a:off x="457200" y="6656832"/>
-            <a:ext cx="4114800" cy="457200"/>
-          </a:xfrm>
-          <a:prstGeom prst="rect">
-            <a:avLst/>
-          </a:prstGeom>
-          <a:noFill/>
-        </p:spPr>
-        <p:txBody>
-          <a:bodyPr wrap="none">
-            <a:spAutoFit/>
-          </a:bodyPr>
-          <a:lstStyle/>
-          <a:p>
-            <a:pPr algn="l">
-              <a:defRPr sz="1000"/>
-            </a:pPr>
-            <a:r>
-              <a:t>© 2023 Taulia LLC. Confidential information. Do not distribute.</a:t>
-            </a:r>
-          </a:p>
-        </p:txBody>
-      </p:sp>
-      <p:sp>
-        <p:nvSpPr>
-          <p:cNvPr id="6" name="Rectangle 5"/>
-          <p:cNvSpPr/>
-          <p:nvPr/>
-        </p:nvSpPr>
-        <p:spPr>
-          <a:xfrm>
-            <a:off x="4572000" y="6720840"/>
-            <a:ext cx="4572000" cy="137160"/>
-          </a:xfrm>
-          <a:prstGeom prst="rect">
-            <a:avLst/>
-          </a:prstGeom>
-          <a:solidFill>
-            <a:srgbClr val="FF6600"/>
-          </a:solidFill>
-          <a:ln>
-            <a:noFill/>
-          </a:ln>
-        </p:spPr>
-        <p:style>
-          <a:lnRef idx="1">
-            <a:schemeClr val="accent1"/>
-          </a:lnRef>
-          <a:fillRef idx="3">
-            <a:schemeClr val="accent1"/>
-          </a:fillRef>
-          <a:effectRef idx="2">
-            <a:schemeClr val="accent1"/>
-          </a:effectRef>
-          <a:fontRef idx="minor">
-            <a:schemeClr val="lt1"/>
-          </a:fontRef>
-        </p:style>
-        <p:txBody>
-          <a:bodyPr rtlCol="0" anchor="ctr"/>
-          <a:lstStyle/>
-          <a:p>
-            <a:pPr algn="ctr"/>
-          </a:p>
-        </p:txBody>
-      </p:sp>
-    </p:spTree>
-  </p:cSld>
-  <p:clrMapOvr>
-    <a:masterClrMapping/>
-  </p:clrMapOvr>
-</p:sld>
-</file>
-
-<file path=ppt/slides/slide13.xml><?xml version="1.0" encoding="utf-8"?>
-<p:sld xmlns:a="http://schemas.openxmlformats.org/drawingml/2006/main" xmlns:p="http://schemas.openxmlformats.org/presentationml/2006/main" xmlns:r="http://schemas.openxmlformats.org/officeDocument/2006/relationships">
-  <p:cSld>
-    <p:spTree>
-      <p:nvGrpSpPr>
-        <p:cNvPr id="1" name=""/>
-        <p:cNvGrpSpPr/>
-        <p:nvPr/>
-      </p:nvGrpSpPr>
-      <p:grpSpPr/>
-      <p:sp>
-        <p:nvSpPr>
-          <p:cNvPr id="2" name="Title 1"/>
-          <p:cNvSpPr>
-            <a:spLocks noGrp="1"/>
-          </p:cNvSpPr>
-          <p:nvPr>
-            <p:ph type="title"/>
-          </p:nvPr>
-        </p:nvSpPr>
-        <p:spPr/>
-        <p:txBody>
-          <a:bodyPr/>
-          <a:lstStyle/>
-          <a:p>
-            <a:r>
-              <a:t>Early Payment Adoption by Sector</a:t>
-            </a:r>
-          </a:p>
-        </p:txBody>
-      </p:sp>
-      <p:pic>
-        <p:nvPicPr>
-          <p:cNvPr id="3" name="Picture 2" descr="Early Payment Adoption by Sector.png"/>
-          <p:cNvPicPr>
-            <a:picLocks noChangeAspect="1"/>
-          </p:cNvPicPr>
-          <p:nvPr/>
-        </p:nvPicPr>
-        <p:blipFill>
-          <a:blip r:embed="rId2"/>
-          <a:stretch>
-            <a:fillRect/>
-          </a:stretch>
-        </p:blipFill>
-        <p:spPr>
-          <a:xfrm>
-            <a:off x="914400" y="1371600"/>
-            <a:ext cx="4187568" cy="4572000"/>
-          </a:xfrm>
-          <a:prstGeom prst="rect">
-            <a:avLst/>
-          </a:prstGeom>
-        </p:spPr>
-      </p:pic>
-      <p:pic>
-        <p:nvPicPr>
-          <p:cNvPr id="4" name="Picture 3" descr="taulia-logo.png"/>
-          <p:cNvPicPr>
-            <a:picLocks noChangeAspect="1"/>
-          </p:cNvPicPr>
-          <p:nvPr/>
-        </p:nvPicPr>
-        <p:blipFill>
-          <a:blip r:embed="rId3"/>
-          <a:stretch>
-            <a:fillRect/>
-          </a:stretch>
-        </p:blipFill>
-        <p:spPr>
-          <a:xfrm>
-            <a:off x="7315200" y="365760"/>
-            <a:ext cx="1050029" cy="274320"/>
-          </a:xfrm>
-          <a:prstGeom prst="rect">
-            <a:avLst/>
-          </a:prstGeom>
-        </p:spPr>
-      </p:pic>
-      <p:sp>
-        <p:nvSpPr>
-          <p:cNvPr id="5" name="TextBox 4"/>
-          <p:cNvSpPr txBox="1"/>
-          <p:nvPr/>
-        </p:nvSpPr>
-        <p:spPr>
-          <a:xfrm>
-            <a:off x="457200" y="6656832"/>
-            <a:ext cx="4114800" cy="457200"/>
-          </a:xfrm>
-          <a:prstGeom prst="rect">
-            <a:avLst/>
-          </a:prstGeom>
-          <a:noFill/>
-        </p:spPr>
-        <p:txBody>
-          <a:bodyPr wrap="none">
-            <a:spAutoFit/>
-          </a:bodyPr>
-          <a:lstStyle/>
-          <a:p>
-            <a:pPr algn="l">
-              <a:defRPr sz="1000"/>
-            </a:pPr>
-            <a:r>
-              <a:t>© 2023 Taulia LLC. Confidential information. Do not distribute.</a:t>
-            </a:r>
-          </a:p>
-        </p:txBody>
-      </p:sp>
-      <p:sp>
-        <p:nvSpPr>
-          <p:cNvPr id="6" name="Rectangle 5"/>
-          <p:cNvSpPr/>
-          <p:nvPr/>
-        </p:nvSpPr>
-        <p:spPr>
-          <a:xfrm>
-            <a:off x="4572000" y="6720840"/>
-            <a:ext cx="4572000" cy="137160"/>
-          </a:xfrm>
-          <a:prstGeom prst="rect">
-            <a:avLst/>
-          </a:prstGeom>
-          <a:solidFill>
-            <a:srgbClr val="FF6600"/>
-          </a:solidFill>
-          <a:ln>
-            <a:noFill/>
-          </a:ln>
-        </p:spPr>
-        <p:style>
-          <a:lnRef idx="1">
-            <a:schemeClr val="accent1"/>
-          </a:lnRef>
-          <a:fillRef idx="3">
-            <a:schemeClr val="accent1"/>
-          </a:fillRef>
-          <a:effectRef idx="2">
-            <a:schemeClr val="accent1"/>
-          </a:effectRef>
-          <a:fontRef idx="minor">
-            <a:schemeClr val="lt1"/>
-          </a:fontRef>
-        </p:style>
-        <p:txBody>
-          <a:bodyPr rtlCol="0" anchor="ctr"/>
-          <a:lstStyle/>
-          <a:p>
-            <a:pPr algn="ctr"/>
-          </a:p>
-        </p:txBody>
-      </p:sp>
-    </p:spTree>
-  </p:cSld>
-  <p:clrMapOvr>
-    <a:masterClrMapping/>
-  </p:clrMapOvr>
-</p:sld>
-</file>
-
-<file path=ppt/slides/slide14.xml><?xml version="1.0" encoding="utf-8"?>
-<p:sld xmlns:a="http://schemas.openxmlformats.org/drawingml/2006/main" xmlns:p="http://schemas.openxmlformats.org/presentationml/2006/main" xmlns:r="http://schemas.openxmlformats.org/officeDocument/2006/relationships">
-  <p:cSld>
-    <p:spTree>
-      <p:nvGrpSpPr>
-        <p:cNvPr id="1" name=""/>
-        <p:cNvGrpSpPr/>
-        <p:nvPr/>
-      </p:nvGrpSpPr>
-      <p:grpSpPr/>
-      <p:sp>
-        <p:nvSpPr>
-          <p:cNvPr id="2" name="Title 1"/>
-          <p:cNvSpPr>
-            <a:spLocks noGrp="1"/>
-          </p:cNvSpPr>
-          <p:nvPr>
-            <p:ph type="title"/>
-          </p:nvPr>
-        </p:nvSpPr>
-        <p:spPr/>
-        <p:txBody>
-          <a:bodyPr/>
-          <a:lstStyle/>
-          <a:p>
-            <a:r>
-              <a:t>Target Working Capital Impact</a:t>
-            </a:r>
-          </a:p>
-        </p:txBody>
-      </p:sp>
-      <p:pic>
-        <p:nvPicPr>
-          <p:cNvPr id="3" name="Picture 2" descr="Target Working Capital Impact.png"/>
-          <p:cNvPicPr>
-            <a:picLocks noChangeAspect="1"/>
-          </p:cNvPicPr>
-          <p:nvPr/>
-        </p:nvPicPr>
-        <p:blipFill>
-          <a:blip r:embed="rId2"/>
-          <a:stretch>
-            <a:fillRect/>
-          </a:stretch>
-        </p:blipFill>
-        <p:spPr>
-          <a:xfrm>
-            <a:off x="914400" y="1371600"/>
-            <a:ext cx="4187568" cy="4572000"/>
-          </a:xfrm>
-          <a:prstGeom prst="rect">
-            <a:avLst/>
-          </a:prstGeom>
-        </p:spPr>
-      </p:pic>
-      <p:pic>
-        <p:nvPicPr>
-          <p:cNvPr id="4" name="Picture 3" descr="taulia-logo.png"/>
-          <p:cNvPicPr>
-            <a:picLocks noChangeAspect="1"/>
-          </p:cNvPicPr>
-          <p:nvPr/>
-        </p:nvPicPr>
-        <p:blipFill>
-          <a:blip r:embed="rId3"/>
-          <a:stretch>
-            <a:fillRect/>
-          </a:stretch>
-        </p:blipFill>
-        <p:spPr>
-          <a:xfrm>
-            <a:off x="7315200" y="365760"/>
-            <a:ext cx="1050029" cy="274320"/>
-          </a:xfrm>
-          <a:prstGeom prst="rect">
-            <a:avLst/>
-          </a:prstGeom>
-        </p:spPr>
-      </p:pic>
-      <p:sp>
-        <p:nvSpPr>
-          <p:cNvPr id="5" name="TextBox 4"/>
-          <p:cNvSpPr txBox="1"/>
-          <p:nvPr/>
-        </p:nvSpPr>
-        <p:spPr>
-          <a:xfrm>
-            <a:off x="457200" y="6656832"/>
-            <a:ext cx="4114800" cy="457200"/>
-          </a:xfrm>
-          <a:prstGeom prst="rect">
-            <a:avLst/>
-          </a:prstGeom>
-          <a:noFill/>
-        </p:spPr>
-        <p:txBody>
-          <a:bodyPr wrap="none">
-            <a:spAutoFit/>
-          </a:bodyPr>
-          <a:lstStyle/>
-          <a:p>
-            <a:pPr algn="l">
-              <a:defRPr sz="1000"/>
-            </a:pPr>
-            <a:r>
-              <a:t>© 2023 Taulia LLC. Confidential information. Do not distribute.</a:t>
-            </a:r>
-          </a:p>
-        </p:txBody>
-      </p:sp>
-      <p:sp>
-        <p:nvSpPr>
-          <p:cNvPr id="6" name="Rectangle 5"/>
-          <p:cNvSpPr/>
-          <p:nvPr/>
-        </p:nvSpPr>
-        <p:spPr>
-          <a:xfrm>
-            <a:off x="4572000" y="6720840"/>
-            <a:ext cx="4572000" cy="137160"/>
-          </a:xfrm>
-          <a:prstGeom prst="rect">
-            <a:avLst/>
-          </a:prstGeom>
-          <a:solidFill>
-            <a:srgbClr val="FF6600"/>
-          </a:solidFill>
-          <a:ln>
-            <a:noFill/>
-          </a:ln>
-        </p:spPr>
-        <p:style>
-          <a:lnRef idx="1">
-            <a:schemeClr val="accent1"/>
-          </a:lnRef>
-          <a:fillRef idx="3">
-            <a:schemeClr val="accent1"/>
-          </a:fillRef>
-          <a:effectRef idx="2">
-            <a:schemeClr val="accent1"/>
-          </a:effectRef>
-          <a:fontRef idx="minor">
-            <a:schemeClr val="lt1"/>
-          </a:fontRef>
-        </p:style>
-        <p:txBody>
-          <a:bodyPr rtlCol="0" anchor="ctr"/>
-          <a:lstStyle/>
-          <a:p>
-            <a:pPr algn="ctr"/>
-          </a:p>
-        </p:txBody>
-      </p:sp>
-    </p:spTree>
-  </p:cSld>
-  <p:clrMapOvr>
-    <a:masterClrMapping/>
-  </p:clrMapOvr>
-</p:sld>
-</file>
-
-<file path=ppt/slides/slide15.xml><?xml version="1.0" encoding="utf-8"?>
-<p:sld xmlns:a="http://schemas.openxmlformats.org/drawingml/2006/main" xmlns:p="http://schemas.openxmlformats.org/presentationml/2006/main" xmlns:r="http://schemas.openxmlformats.org/officeDocument/2006/relationships">
-  <p:cSld>
-    <p:spTree>
-      <p:nvGrpSpPr>
-        <p:cNvPr id="1" name=""/>
-        <p:cNvGrpSpPr/>
-        <p:nvPr/>
-      </p:nvGrpSpPr>
-      <p:grpSpPr/>
-      <p:sp>
-        <p:nvSpPr>
-          <p:cNvPr id="2" name="Title 1"/>
-          <p:cNvSpPr>
-            <a:spLocks noGrp="1"/>
-          </p:cNvSpPr>
-          <p:nvPr>
-            <p:ph type="title"/>
-          </p:nvPr>
-        </p:nvSpPr>
-        <p:spPr/>
-        <p:txBody>
-          <a:bodyPr/>
-          <a:lstStyle/>
-          <a:p>
-            <a:r>
-              <a:t>Cash from Other Funders</a:t>
-            </a:r>
-          </a:p>
-        </p:txBody>
-      </p:sp>
-      <p:pic>
-        <p:nvPicPr>
-          <p:cNvPr id="3" name="Picture 2" descr="Cash from Other Funders.png"/>
-          <p:cNvPicPr>
-            <a:picLocks noChangeAspect="1"/>
-          </p:cNvPicPr>
-          <p:nvPr/>
-        </p:nvPicPr>
-        <p:blipFill>
-          <a:blip r:embed="rId2"/>
-          <a:stretch>
-            <a:fillRect/>
-          </a:stretch>
-        </p:blipFill>
-        <p:spPr>
-          <a:xfrm>
-            <a:off x="914400" y="1371600"/>
-            <a:ext cx="4187568" cy="4572000"/>
-          </a:xfrm>
-          <a:prstGeom prst="rect">
-            <a:avLst/>
-          </a:prstGeom>
-        </p:spPr>
-      </p:pic>
-      <p:pic>
-        <p:nvPicPr>
-          <p:cNvPr id="4" name="Picture 3" descr="taulia-logo.png"/>
-          <p:cNvPicPr>
-            <a:picLocks noChangeAspect="1"/>
-          </p:cNvPicPr>
-          <p:nvPr/>
-        </p:nvPicPr>
-        <p:blipFill>
-          <a:blip r:embed="rId3"/>
-          <a:stretch>
-            <a:fillRect/>
-          </a:stretch>
-        </p:blipFill>
-        <p:spPr>
-          <a:xfrm>
-            <a:off x="7315200" y="365760"/>
-            <a:ext cx="1050029" cy="274320"/>
-          </a:xfrm>
-          <a:prstGeom prst="rect">
-            <a:avLst/>
-          </a:prstGeom>
-        </p:spPr>
-      </p:pic>
-      <p:sp>
-        <p:nvSpPr>
-          <p:cNvPr id="5" name="TextBox 4"/>
-          <p:cNvSpPr txBox="1"/>
-          <p:nvPr/>
-        </p:nvSpPr>
-        <p:spPr>
-          <a:xfrm>
-            <a:off x="457200" y="6656832"/>
-            <a:ext cx="4114800" cy="457200"/>
-          </a:xfrm>
-          <a:prstGeom prst="rect">
-            <a:avLst/>
-          </a:prstGeom>
-          <a:noFill/>
-        </p:spPr>
-        <p:txBody>
-          <a:bodyPr wrap="none">
-            <a:spAutoFit/>
-          </a:bodyPr>
-          <a:lstStyle/>
-          <a:p>
-            <a:pPr algn="l">
-              <a:defRPr sz="1000"/>
-            </a:pPr>
-            <a:r>
-              <a:t>© 2023 Taulia LLC. Confidential information. Do not distribute.</a:t>
-            </a:r>
-          </a:p>
-        </p:txBody>
-      </p:sp>
-      <p:sp>
-        <p:nvSpPr>
-          <p:cNvPr id="6" name="Rectangle 5"/>
-          <p:cNvSpPr/>
-          <p:nvPr/>
-        </p:nvSpPr>
-        <p:spPr>
-          <a:xfrm>
-            <a:off x="4572000" y="6720840"/>
-            <a:ext cx="4572000" cy="137160"/>
-          </a:xfrm>
-          <a:prstGeom prst="rect">
-            <a:avLst/>
-          </a:prstGeom>
-          <a:solidFill>
-            <a:srgbClr val="FF6600"/>
-          </a:solidFill>
-          <a:ln>
-            <a:noFill/>
-          </a:ln>
-        </p:spPr>
-        <p:style>
-          <a:lnRef idx="1">
-            <a:schemeClr val="accent1"/>
-          </a:lnRef>
-          <a:fillRef idx="3">
-            <a:schemeClr val="accent1"/>
-          </a:fillRef>
-          <a:effectRef idx="2">
-            <a:schemeClr val="accent1"/>
-          </a:effectRef>
-          <a:fontRef idx="minor">
-            <a:schemeClr val="lt1"/>
-          </a:fontRef>
-        </p:style>
-        <p:txBody>
-          <a:bodyPr rtlCol="0" anchor="ctr"/>
-          <a:lstStyle/>
-          <a:p>
-            <a:pPr algn="ctr"/>
-          </a:p>
-        </p:txBody>
-      </p:sp>
-    </p:spTree>
-  </p:cSld>
-  <p:clrMapOvr>
-    <a:masterClrMapping/>
-  </p:clrMapOvr>
-</p:sld>
-</file>
-
-<file path=ppt/slides/slide16.xml><?xml version="1.0" encoding="utf-8"?>
-<p:sld xmlns:a="http://schemas.openxmlformats.org/drawingml/2006/main" xmlns:p="http://schemas.openxmlformats.org/presentationml/2006/main" xmlns:r="http://schemas.openxmlformats.org/officeDocument/2006/relationships">
-  <p:cSld>
-    <p:spTree>
-      <p:nvGrpSpPr>
-        <p:cNvPr id="1" name=""/>
-        <p:cNvGrpSpPr/>
-        <p:nvPr/>
-      </p:nvGrpSpPr>
-      <p:grpSpPr/>
-      <p:sp>
-        <p:nvSpPr>
-          <p:cNvPr id="2" name="Title 1"/>
-          <p:cNvSpPr>
-            <a:spLocks noGrp="1"/>
-          </p:cNvSpPr>
-          <p:nvPr>
-            <p:ph type="title"/>
-          </p:nvPr>
-        </p:nvSpPr>
-        <p:spPr/>
-        <p:txBody>
-          <a:bodyPr/>
-          <a:lstStyle/>
-          <a:p>
-            <a:r>
-              <a:t>Current Average Terms</a:t>
-            </a:r>
-          </a:p>
-        </p:txBody>
-      </p:sp>
-      <p:pic>
-        <p:nvPicPr>
-          <p:cNvPr id="3" name="Picture 2" descr="Current Average Terms.png"/>
-          <p:cNvPicPr>
-            <a:picLocks noChangeAspect="1"/>
-          </p:cNvPicPr>
-          <p:nvPr/>
-        </p:nvPicPr>
-        <p:blipFill>
-          <a:blip r:embed="rId2"/>
-          <a:stretch>
-            <a:fillRect/>
-          </a:stretch>
-        </p:blipFill>
-        <p:spPr>
-          <a:xfrm>
-            <a:off x="914400" y="1371600"/>
-            <a:ext cx="4187568" cy="4572000"/>
-          </a:xfrm>
-          <a:prstGeom prst="rect">
-            <a:avLst/>
-          </a:prstGeom>
-        </p:spPr>
-      </p:pic>
-      <p:pic>
-        <p:nvPicPr>
-          <p:cNvPr id="4" name="Picture 3" descr="taulia-logo.png"/>
-          <p:cNvPicPr>
-            <a:picLocks noChangeAspect="1"/>
-          </p:cNvPicPr>
-          <p:nvPr/>
-        </p:nvPicPr>
-        <p:blipFill>
-          <a:blip r:embed="rId3"/>
-          <a:stretch>
-            <a:fillRect/>
-          </a:stretch>
-        </p:blipFill>
-        <p:spPr>
-          <a:xfrm>
-            <a:off x="7315200" y="365760"/>
-            <a:ext cx="1050029" cy="274320"/>
-          </a:xfrm>
-          <a:prstGeom prst="rect">
-            <a:avLst/>
-          </a:prstGeom>
-        </p:spPr>
-      </p:pic>
-      <p:sp>
-        <p:nvSpPr>
-          <p:cNvPr id="5" name="TextBox 4"/>
-          <p:cNvSpPr txBox="1"/>
-          <p:nvPr/>
-        </p:nvSpPr>
-        <p:spPr>
-          <a:xfrm>
-            <a:off x="457200" y="6656832"/>
-            <a:ext cx="4114800" cy="457200"/>
-          </a:xfrm>
-          <a:prstGeom prst="rect">
-            <a:avLst/>
-          </a:prstGeom>
-          <a:noFill/>
-        </p:spPr>
-        <p:txBody>
-          <a:bodyPr wrap="none">
-            <a:spAutoFit/>
-          </a:bodyPr>
-          <a:lstStyle/>
-          <a:p>
-            <a:pPr algn="l">
-              <a:defRPr sz="1000"/>
-            </a:pPr>
-            <a:r>
-              <a:t>© 2023 Taulia LLC. Confidential information. Do not distribute.</a:t>
-            </a:r>
-          </a:p>
-        </p:txBody>
-      </p:sp>
-      <p:sp>
-        <p:nvSpPr>
-          <p:cNvPr id="6" name="Rectangle 5"/>
-          <p:cNvSpPr/>
-          <p:nvPr/>
-        </p:nvSpPr>
-        <p:spPr>
-          <a:xfrm>
-            <a:off x="4572000" y="6720840"/>
-            <a:ext cx="4572000" cy="137160"/>
-          </a:xfrm>
-          <a:prstGeom prst="rect">
-            <a:avLst/>
-          </a:prstGeom>
-          <a:solidFill>
-            <a:srgbClr val="FF6600"/>
-          </a:solidFill>
-          <a:ln>
-            <a:noFill/>
-          </a:ln>
-        </p:spPr>
-        <p:style>
-          <a:lnRef idx="1">
-            <a:schemeClr val="accent1"/>
-          </a:lnRef>
-          <a:fillRef idx="3">
-            <a:schemeClr val="accent1"/>
-          </a:fillRef>
-          <a:effectRef idx="2">
-            <a:schemeClr val="accent1"/>
-          </a:effectRef>
-          <a:fontRef idx="minor">
-            <a:schemeClr val="lt1"/>
-          </a:fontRef>
-        </p:style>
-        <p:txBody>
-          <a:bodyPr rtlCol="0" anchor="ctr"/>
-          <a:lstStyle/>
-          <a:p>
-            <a:pPr algn="ctr"/>
-          </a:p>
-        </p:txBody>
-      </p:sp>
-    </p:spTree>
-  </p:cSld>
-  <p:clrMapOvr>
-    <a:masterClrMapping/>
-  </p:clrMapOvr>
-</p:sld>
-</file>
-
-<file path=ppt/slides/slide17.xml><?xml version="1.0" encoding="utf-8"?>
-<p:sld xmlns:a="http://schemas.openxmlformats.org/drawingml/2006/main" xmlns:p="http://schemas.openxmlformats.org/presentationml/2006/main" xmlns:r="http://schemas.openxmlformats.org/officeDocument/2006/relationships">
-  <p:cSld>
-    <p:spTree>
-      <p:nvGrpSpPr>
-        <p:cNvPr id="1" name=""/>
-        <p:cNvGrpSpPr/>
-        <p:nvPr/>
-      </p:nvGrpSpPr>
-      <p:grpSpPr/>
-      <p:sp>
-        <p:nvSpPr>
-          <p:cNvPr id="2" name="Title 1"/>
-          <p:cNvSpPr>
-            <a:spLocks noGrp="1"/>
-          </p:cNvSpPr>
-          <p:nvPr>
-            <p:ph type="title"/>
-          </p:nvPr>
-        </p:nvSpPr>
-        <p:spPr/>
-        <p:txBody>
-          <a:bodyPr/>
-          <a:lstStyle/>
-          <a:p>
-            <a:r>
-              <a:t>Total Early Payment Adoption</a:t>
-            </a:r>
-          </a:p>
-        </p:txBody>
-      </p:sp>
-      <p:pic>
-        <p:nvPicPr>
-          <p:cNvPr id="3" name="Picture 2" descr="Total Early Payment Adoption.png"/>
-          <p:cNvPicPr>
-            <a:picLocks noChangeAspect="1"/>
-          </p:cNvPicPr>
-          <p:nvPr/>
-        </p:nvPicPr>
-        <p:blipFill>
-          <a:blip r:embed="rId2"/>
-          <a:stretch>
-            <a:fillRect/>
-          </a:stretch>
-        </p:blipFill>
-        <p:spPr>
-          <a:xfrm>
-            <a:off x="914400" y="1371600"/>
-            <a:ext cx="4187568" cy="4572000"/>
-          </a:xfrm>
-          <a:prstGeom prst="rect">
-            <a:avLst/>
-          </a:prstGeom>
-        </p:spPr>
-      </p:pic>
-      <p:pic>
-        <p:nvPicPr>
-          <p:cNvPr id="4" name="Picture 3" descr="taulia-logo.png"/>
-          <p:cNvPicPr>
-            <a:picLocks noChangeAspect="1"/>
-          </p:cNvPicPr>
-          <p:nvPr/>
-        </p:nvPicPr>
-        <p:blipFill>
-          <a:blip r:embed="rId3"/>
-          <a:stretch>
-            <a:fillRect/>
-          </a:stretch>
-        </p:blipFill>
-        <p:spPr>
-          <a:xfrm>
-            <a:off x="7315200" y="365760"/>
-            <a:ext cx="1050029" cy="274320"/>
-          </a:xfrm>
-          <a:prstGeom prst="rect">
-            <a:avLst/>
-          </a:prstGeom>
-        </p:spPr>
-      </p:pic>
-      <p:sp>
-        <p:nvSpPr>
-          <p:cNvPr id="5" name="TextBox 4"/>
-          <p:cNvSpPr txBox="1"/>
-          <p:nvPr/>
-        </p:nvSpPr>
-        <p:spPr>
-          <a:xfrm>
-            <a:off x="457200" y="6656832"/>
-            <a:ext cx="4114800" cy="457200"/>
-          </a:xfrm>
-          <a:prstGeom prst="rect">
-            <a:avLst/>
-          </a:prstGeom>
-          <a:noFill/>
-        </p:spPr>
-        <p:txBody>
-          <a:bodyPr wrap="none">
-            <a:spAutoFit/>
-          </a:bodyPr>
-          <a:lstStyle/>
-          <a:p>
-            <a:pPr algn="l">
-              <a:defRPr sz="1000"/>
-            </a:pPr>
-            <a:r>
-              <a:t>© 2023 Taulia LLC. Confidential information. Do not distribute.</a:t>
-            </a:r>
-          </a:p>
-        </p:txBody>
-      </p:sp>
-      <p:sp>
-        <p:nvSpPr>
-          <p:cNvPr id="6" name="Rectangle 5"/>
-          <p:cNvSpPr/>
-          <p:nvPr/>
-        </p:nvSpPr>
-        <p:spPr>
-          <a:xfrm>
-            <a:off x="4572000" y="6720840"/>
-            <a:ext cx="4572000" cy="137160"/>
-          </a:xfrm>
-          <a:prstGeom prst="rect">
-            <a:avLst/>
-          </a:prstGeom>
-          <a:solidFill>
-            <a:srgbClr val="FF6600"/>
-          </a:solidFill>
-          <a:ln>
-            <a:noFill/>
-          </a:ln>
-        </p:spPr>
-        <p:style>
-          <a:lnRef idx="1">
-            <a:schemeClr val="accent1"/>
-          </a:lnRef>
-          <a:fillRef idx="3">
-            <a:schemeClr val="accent1"/>
-          </a:fillRef>
-          <a:effectRef idx="2">
-            <a:schemeClr val="accent1"/>
-          </a:effectRef>
-          <a:fontRef idx="minor">
-            <a:schemeClr val="lt1"/>
-          </a:fontRef>
-        </p:style>
-        <p:txBody>
-          <a:bodyPr rtlCol="0" anchor="ctr"/>
-          <a:lstStyle/>
-          <a:p>
-            <a:pPr algn="ctr"/>
-          </a:p>
-        </p:txBody>
-      </p:sp>
-    </p:spTree>
-  </p:cSld>
-  <p:clrMapOvr>
-    <a:masterClrMapping/>
-  </p:clrMapOvr>
-</p:sld>
-</file>
-
-<file path=ppt/slides/slide18.xml><?xml version="1.0" encoding="utf-8"?>
-<p:sld xmlns:a="http://schemas.openxmlformats.org/drawingml/2006/main" xmlns:p="http://schemas.openxmlformats.org/presentationml/2006/main" xmlns:r="http://schemas.openxmlformats.org/officeDocument/2006/relationships">
-  <p:cSld>
-    <p:spTree>
-      <p:nvGrpSpPr>
-        <p:cNvPr id="1" name=""/>
-        <p:cNvGrpSpPr/>
-        <p:nvPr/>
-      </p:nvGrpSpPr>
-      <p:grpSpPr/>
-      <p:sp>
-        <p:nvSpPr>
-          <p:cNvPr id="2" name="Title 1"/>
-          <p:cNvSpPr>
-            <a:spLocks noGrp="1"/>
-          </p:cNvSpPr>
-          <p:nvPr>
-            <p:ph type="title"/>
-          </p:nvPr>
-        </p:nvSpPr>
-        <p:spPr/>
-        <p:txBody>
-          <a:bodyPr/>
-          <a:lstStyle/>
-          <a:p>
-            <a:r>
-              <a:t>Cash from Treasury</a:t>
-            </a:r>
-          </a:p>
-        </p:txBody>
-      </p:sp>
-      <p:pic>
-        <p:nvPicPr>
-          <p:cNvPr id="3" name="Picture 2" descr="AP Balance Impact.png"/>
-          <p:cNvPicPr>
-            <a:picLocks noChangeAspect="1"/>
-          </p:cNvPicPr>
-          <p:nvPr/>
-        </p:nvPicPr>
-        <p:blipFill>
-          <a:blip r:embed="rId2"/>
-          <a:stretch>
-            <a:fillRect/>
-          </a:stretch>
-        </p:blipFill>
-        <p:spPr>
-          <a:xfrm>
-            <a:off x="914400" y="1371600"/>
-            <a:ext cx="4187568" cy="4572000"/>
-          </a:xfrm>
-          <a:prstGeom prst="rect">
-            <a:avLst/>
-          </a:prstGeom>
-        </p:spPr>
-      </p:pic>
-      <p:pic>
-        <p:nvPicPr>
-          <p:cNvPr id="4" name="Picture 3" descr="taulia-logo.png"/>
-          <p:cNvPicPr>
-            <a:picLocks noChangeAspect="1"/>
-          </p:cNvPicPr>
-          <p:nvPr/>
-        </p:nvPicPr>
-        <p:blipFill>
-          <a:blip r:embed="rId3"/>
-          <a:stretch>
-            <a:fillRect/>
-          </a:stretch>
-        </p:blipFill>
-        <p:spPr>
-          <a:xfrm>
-            <a:off x="7315200" y="365760"/>
-            <a:ext cx="1050029" cy="274320"/>
-          </a:xfrm>
-          <a:prstGeom prst="rect">
-            <a:avLst/>
-          </a:prstGeom>
-        </p:spPr>
-      </p:pic>
-      <p:sp>
-        <p:nvSpPr>
-          <p:cNvPr id="5" name="TextBox 4"/>
-          <p:cNvSpPr txBox="1"/>
-          <p:nvPr/>
-        </p:nvSpPr>
-        <p:spPr>
-          <a:xfrm>
-            <a:off x="457200" y="6656832"/>
-            <a:ext cx="4114800" cy="457200"/>
-          </a:xfrm>
-          <a:prstGeom prst="rect">
-            <a:avLst/>
-          </a:prstGeom>
-          <a:noFill/>
-        </p:spPr>
-        <p:txBody>
-          <a:bodyPr wrap="none">
-            <a:spAutoFit/>
-          </a:bodyPr>
-          <a:lstStyle/>
-          <a:p>
-            <a:pPr algn="l">
-              <a:defRPr sz="1000"/>
-            </a:pPr>
-            <a:r>
-              <a:t>© 2023 Taulia LLC. Confidential information. Do not distribute.</a:t>
-            </a:r>
-          </a:p>
-        </p:txBody>
-      </p:sp>
-      <p:sp>
-        <p:nvSpPr>
-          <p:cNvPr id="6" name="Rectangle 5"/>
-          <p:cNvSpPr/>
-          <p:nvPr/>
-        </p:nvSpPr>
-        <p:spPr>
-          <a:xfrm>
-            <a:off x="4572000" y="6720840"/>
-            <a:ext cx="4572000" cy="137160"/>
-          </a:xfrm>
-          <a:prstGeom prst="rect">
-            <a:avLst/>
-          </a:prstGeom>
-          <a:solidFill>
-            <a:srgbClr val="FF6600"/>
-          </a:solidFill>
-          <a:ln>
-            <a:noFill/>
-          </a:ln>
-        </p:spPr>
-        <p:style>
-          <a:lnRef idx="1">
-            <a:schemeClr val="accent1"/>
-          </a:lnRef>
-          <a:fillRef idx="3">
-            <a:schemeClr val="accent1"/>
-          </a:fillRef>
-          <a:effectRef idx="2">
-            <a:schemeClr val="accent1"/>
-          </a:effectRef>
-          <a:fontRef idx="minor">
-            <a:schemeClr val="lt1"/>
-          </a:fontRef>
-        </p:style>
-        <p:txBody>
-          <a:bodyPr rtlCol="0" anchor="ctr"/>
-          <a:lstStyle/>
-          <a:p>
-            <a:pPr algn="ctr"/>
-          </a:p>
-        </p:txBody>
-      </p:sp>
-    </p:spTree>
-  </p:cSld>
-  <p:clrMapOvr>
-    <a:masterClrMapping/>
-  </p:clrMapOvr>
-</p:sld>
-</file>
-
-<file path=ppt/slides/slide19.xml><?xml version="1.0" encoding="utf-8"?>
-<p:sld xmlns:a="http://schemas.openxmlformats.org/drawingml/2006/main" xmlns:p="http://schemas.openxmlformats.org/presentationml/2006/main" xmlns:r="http://schemas.openxmlformats.org/officeDocument/2006/relationships">
-  <p:cSld>
-    <p:spTree>
-      <p:nvGrpSpPr>
-        <p:cNvPr id="1" name=""/>
-        <p:cNvGrpSpPr/>
-        <p:nvPr/>
-      </p:nvGrpSpPr>
-      <p:grpSpPr/>
-      <p:sp>
-        <p:nvSpPr>
-          <p:cNvPr id="2" name="Title 1"/>
-          <p:cNvSpPr>
-            <a:spLocks noGrp="1"/>
-          </p:cNvSpPr>
-          <p:nvPr>
-            <p:ph type="title"/>
-          </p:nvPr>
-        </p:nvSpPr>
-        <p:spPr/>
-        <p:txBody>
-          <a:bodyPr/>
-          <a:lstStyle/>
-          <a:p>
-            <a:r>
-              <a:t>Avg Return on Capital</a:t>
-            </a:r>
-          </a:p>
-        </p:txBody>
-      </p:sp>
-      <p:pic>
-        <p:nvPicPr>
-          <p:cNvPr id="3" name="Picture 2" descr="Avg Return on Capital.png"/>
-          <p:cNvPicPr>
-            <a:picLocks noChangeAspect="1"/>
-          </p:cNvPicPr>
-          <p:nvPr/>
-        </p:nvPicPr>
-        <p:blipFill>
-          <a:blip r:embed="rId2"/>
-          <a:stretch>
-            <a:fillRect/>
-          </a:stretch>
-        </p:blipFill>
-        <p:spPr>
-          <a:xfrm>
-            <a:off x="914400" y="1371600"/>
-            <a:ext cx="4187568" cy="4572000"/>
-          </a:xfrm>
-          <a:prstGeom prst="rect">
-            <a:avLst/>
-          </a:prstGeom>
-        </p:spPr>
-      </p:pic>
-      <p:pic>
-        <p:nvPicPr>
-          <p:cNvPr id="4" name="Picture 3" descr="taulia-logo.png"/>
-          <p:cNvPicPr>
-            <a:picLocks noChangeAspect="1"/>
-          </p:cNvPicPr>
-          <p:nvPr/>
-        </p:nvPicPr>
-        <p:blipFill>
-          <a:blip r:embed="rId3"/>
-          <a:stretch>
-            <a:fillRect/>
-          </a:stretch>
-        </p:blipFill>
-        <p:spPr>
-          <a:xfrm>
-            <a:off x="7315200" y="365760"/>
-            <a:ext cx="1050029" cy="274320"/>
-          </a:xfrm>
-          <a:prstGeom prst="rect">
-            <a:avLst/>
-          </a:prstGeom>
-        </p:spPr>
-      </p:pic>
-      <p:sp>
-        <p:nvSpPr>
-          <p:cNvPr id="5" name="TextBox 4"/>
-          <p:cNvSpPr txBox="1"/>
-          <p:nvPr/>
-        </p:nvSpPr>
-        <p:spPr>
-          <a:xfrm>
-            <a:off x="457200" y="6656832"/>
-            <a:ext cx="4114800" cy="457200"/>
-          </a:xfrm>
-          <a:prstGeom prst="rect">
-            <a:avLst/>
-          </a:prstGeom>
-          <a:noFill/>
-        </p:spPr>
-        <p:txBody>
-          <a:bodyPr wrap="none">
-            <a:spAutoFit/>
-          </a:bodyPr>
-          <a:lstStyle/>
-          <a:p>
-            <a:pPr algn="l">
-              <a:defRPr sz="1000"/>
-            </a:pPr>
-            <a:r>
-              <a:t>© 2023 Taulia LLC. Confidential information. Do not distribute.</a:t>
-            </a:r>
-          </a:p>
-        </p:txBody>
-      </p:sp>
-      <p:sp>
-        <p:nvSpPr>
-          <p:cNvPr id="6" name="Rectangle 5"/>
-          <p:cNvSpPr/>
-          <p:nvPr/>
-        </p:nvSpPr>
-        <p:spPr>
-          <a:xfrm>
-            <a:off x="4572000" y="6720840"/>
-            <a:ext cx="4572000" cy="137160"/>
-          </a:xfrm>
-          <a:prstGeom prst="rect">
-            <a:avLst/>
-          </a:prstGeom>
-          <a:solidFill>
-            <a:srgbClr val="FF6600"/>
-          </a:solidFill>
-          <a:ln>
-            <a:noFill/>
-          </a:ln>
-        </p:spPr>
-        <p:style>
-          <a:lnRef idx="1">
-            <a:schemeClr val="accent1"/>
-          </a:lnRef>
-          <a:fillRef idx="3">
-            <a:schemeClr val="accent1"/>
-          </a:fillRef>
-          <a:effectRef idx="2">
-            <a:schemeClr val="accent1"/>
-          </a:effectRef>
-          <a:fontRef idx="minor">
-            <a:schemeClr val="lt1"/>
-          </a:fontRef>
-        </p:style>
-        <p:txBody>
-          <a:bodyPr rtlCol="0" anchor="ctr"/>
-          <a:lstStyle/>
-          <a:p>
-            <a:pPr algn="ctr"/>
-          </a:p>
-        </p:txBody>
-      </p:sp>
-    </p:spTree>
-  </p:cSld>
-  <p:clrMapOvr>
-    <a:masterClrMapping/>
-  </p:clrMapOvr>
-</p:sld>
-</file>
-
 <file path=ppt/slides/slide2.xml><?xml version="1.0" encoding="utf-8"?>
 <p:sld xmlns:a="http://schemas.openxmlformats.org/drawingml/2006/main" xmlns:p="http://schemas.openxmlformats.org/presentationml/2006/main" xmlns:r="http://schemas.openxmlformats.org/officeDocument/2006/relationships">
   <p:cSld>
@@ -4904,161 +3281,7 @@
               <a:defRPr sz="1100"/>
             </a:pPr>
             <a:r>
-              <a:t>We have analyzed various aspects of AcmeBirdSeed's financial operations, focusing on working capital management and potential efficiency improvements. Our findings include:</a:t>
-            </a:r>
-          </a:p>
-          <a:p>
-            <a:pPr algn="l">
-              <a:defRPr sz="1100"/>
-            </a:pPr>
-          </a:p>
-          <a:p>
-            <a:pPr algn="l">
-              <a:defRPr sz="1100"/>
-            </a:pPr>
-            <a:r>
-              <a:t>- **Out of Scope Spend**: Identifies categories of spend that are not addressed by the current working capital strategy.</a:t>
-            </a:r>
-          </a:p>
-          <a:p>
-            <a:pPr algn="l">
-              <a:defRPr sz="1100"/>
-            </a:pPr>
-            <a:r>
-              <a:t>- **AP Balance Impact**: Evaluates the impact of accounts payable balances on liquidity.</a:t>
-            </a:r>
-          </a:p>
-          <a:p>
-            <a:pPr algn="l">
-              <a:defRPr sz="1100"/>
-            </a:pPr>
-            <a:r>
-              <a:t>- **Net Impact to Suppliers**: Assesses how changes in payment terms affect suppliers.</a:t>
-            </a:r>
-          </a:p>
-          <a:p>
-            <a:pPr algn="l">
-              <a:defRPr sz="1100"/>
-            </a:pPr>
-            <a:r>
-              <a:t>- **Target Average Terms**: Proposes optimal payment terms to improve cash flow.</a:t>
-            </a:r>
-          </a:p>
-          <a:p>
-            <a:pPr algn="l">
-              <a:defRPr sz="1100"/>
-            </a:pPr>
-            <a:r>
-              <a:t>- **Discount Capture**: Analyzes potential savings from early payment discounts.</a:t>
-            </a:r>
-          </a:p>
-          <a:p>
-            <a:pPr algn="l">
-              <a:defRPr sz="1100"/>
-            </a:pPr>
-            <a:r>
-              <a:t>- **Payment Term Descriptions**: Provides detailed descriptions of current and proposed payment terms.</a:t>
-            </a:r>
-          </a:p>
-          <a:p>
-            <a:pPr algn="l">
-              <a:defRPr sz="1100"/>
-            </a:pPr>
-            <a:r>
-              <a:t>- **Strategic Scenarios**: Outlines different strategic approaches for optimizing working capital.</a:t>
-            </a:r>
-          </a:p>
-          <a:p>
-            <a:pPr algn="l">
-              <a:defRPr sz="1100"/>
-            </a:pPr>
-            <a:r>
-              <a:t>- **DPO Impact**: Measures the impact of Days Payable Outstanding (DPO) on cash flow.</a:t>
-            </a:r>
-          </a:p>
-          <a:p>
-            <a:pPr algn="l">
-              <a:defRPr sz="1100"/>
-            </a:pPr>
-            <a:r>
-              <a:t>- **Payables Concentrations**: Examines the concentration of payables among top suppliers.</a:t>
-            </a:r>
-          </a:p>
-          <a:p>
-            <a:pPr algn="l">
-              <a:defRPr sz="1100"/>
-            </a:pPr>
-            <a:r>
-              <a:t>- **Estimated Payables**: Estimates future payables based on current trends.</a:t>
-            </a:r>
-          </a:p>
-          <a:p>
-            <a:pPr algn="l">
-              <a:defRPr sz="1100"/>
-            </a:pPr>
-            <a:r>
-              <a:t>- **Early Payment Adoption by Sector**: Reviews sector-wise adoption rates of early payment programs.</a:t>
-            </a:r>
-          </a:p>
-          <a:p>
-            <a:pPr algn="l">
-              <a:defRPr sz="1100"/>
-            </a:pPr>
-            <a:r>
-              <a:t>- **Target Working Capital Impact**: Quantifies the potential impact of targeted working capital initiatives.</a:t>
-            </a:r>
-          </a:p>
-          <a:p>
-            <a:pPr algn="l">
-              <a:defRPr sz="1100"/>
-            </a:pPr>
-            <a:r>
-              <a:t>- **Cash from Other Funders**: Identifies alternative funding sources for liquidity.</a:t>
-            </a:r>
-          </a:p>
-          <a:p>
-            <a:pPr algn="l">
-              <a:defRPr sz="1100"/>
-            </a:pPr>
-            <a:r>
-              <a:t>- **Current Average Terms**: Analyzes the current average payment terms used.</a:t>
-            </a:r>
-          </a:p>
-          <a:p>
-            <a:pPr algn="l">
-              <a:defRPr sz="1100"/>
-            </a:pPr>
-            <a:r>
-              <a:t>- **Total Early Payment Adoption**: Summarizes overall adoption rates of early payment discounts.</a:t>
-            </a:r>
-          </a:p>
-          <a:p>
-            <a:pPr algn="l">
-              <a:defRPr sz="1100"/>
-            </a:pPr>
-            <a:r>
-              <a:t>- **Cash from Treasury**: Evaluates the role of treasury in providing liquidity.</a:t>
-            </a:r>
-          </a:p>
-          <a:p>
-            <a:pPr algn="l">
-              <a:defRPr sz="1100"/>
-            </a:pPr>
-            <a:r>
-              <a:t>- **Avg Return on Capital**: Measures the average return on capital for different strategies.</a:t>
-            </a:r>
-          </a:p>
-          <a:p>
-            <a:pPr algn="l">
-              <a:defRPr sz="1100"/>
-            </a:pPr>
-          </a:p>
-          <a:p>
-            <a:pPr algn="l">
-              <a:defRPr sz="1100"/>
-            </a:pPr>
-            <a:r>
-              <a:t>These analyses aim to help AcmeBirdSeed unlock working capital and drive efficiencies through targeted financial strategies.</a:t>
+              <a:t>To create a comprehensive summary based on the images related to AcmeBirdSeed, please upload the images or provide more details about their content. This will help in generating an accurate and concise summary.</a:t>
             </a:r>
           </a:p>
         </p:txBody>
@@ -5171,14 +3394,14 @@
           <a:lstStyle/>
           <a:p>
             <a:r>
-              <a:t>Out of Scope Spend</a:t>
+              <a:t>Card Adoption</a:t>
             </a:r>
           </a:p>
         </p:txBody>
       </p:sp>
       <p:pic>
         <p:nvPicPr>
-          <p:cNvPr id="3" name="Picture 2" descr="Out of Scope Spend.png"/>
+          <p:cNvPr id="3" name="Picture 2" descr="Card Adoption.png"/>
           <p:cNvPicPr>
             <a:picLocks noChangeAspect="1"/>
           </p:cNvPicPr>
@@ -5332,14 +3555,14 @@
           <a:lstStyle/>
           <a:p>
             <a:r>
-              <a:t>AP Balance Impact</a:t>
+              <a:t>Buyer - Payables Planner Supplier List</a:t>
             </a:r>
           </a:p>
         </p:txBody>
       </p:sp>
       <p:pic>
         <p:nvPicPr>
-          <p:cNvPr id="3" name="Picture 2" descr="AP Balance Impact.png"/>
+          <p:cNvPr id="3" name="Picture 2" descr="Buyer - Payables Planner Supplier List.png"/>
           <p:cNvPicPr>
             <a:picLocks noChangeAspect="1"/>
           </p:cNvPicPr>
@@ -5493,14 +3716,14 @@
           <a:lstStyle/>
           <a:p>
             <a:r>
-              <a:t>Net Impact to Suppliers</a:t>
+              <a:t>Supplier Payment Terms Comparison</a:t>
             </a:r>
           </a:p>
         </p:txBody>
       </p:sp>
       <p:pic>
         <p:nvPicPr>
-          <p:cNvPr id="3" name="Picture 2" descr="Net Impact to Suppliers.png"/>
+          <p:cNvPr id="3" name="Picture 2" descr="Supplier Payment Terms Comparison.png"/>
           <p:cNvPicPr>
             <a:picLocks noChangeAspect="1"/>
           </p:cNvPicPr>
@@ -5654,497 +3877,14 @@
           <a:lstStyle/>
           <a:p>
             <a:r>
-              <a:t>Target Average Terms</a:t>
+              <a:t>Peer DPO</a:t>
             </a:r>
           </a:p>
         </p:txBody>
       </p:sp>
       <p:pic>
         <p:nvPicPr>
-          <p:cNvPr id="3" name="Picture 2" descr="Target Average Terms.png"/>
-          <p:cNvPicPr>
-            <a:picLocks noChangeAspect="1"/>
-          </p:cNvPicPr>
-          <p:nvPr/>
-        </p:nvPicPr>
-        <p:blipFill>
-          <a:blip r:embed="rId2"/>
-          <a:stretch>
-            <a:fillRect/>
-          </a:stretch>
-        </p:blipFill>
-        <p:spPr>
-          <a:xfrm>
-            <a:off x="914400" y="1371600"/>
-            <a:ext cx="4187568" cy="4572000"/>
-          </a:xfrm>
-          <a:prstGeom prst="rect">
-            <a:avLst/>
-          </a:prstGeom>
-        </p:spPr>
-      </p:pic>
-      <p:pic>
-        <p:nvPicPr>
-          <p:cNvPr id="4" name="Picture 3" descr="taulia-logo.png"/>
-          <p:cNvPicPr>
-            <a:picLocks noChangeAspect="1"/>
-          </p:cNvPicPr>
-          <p:nvPr/>
-        </p:nvPicPr>
-        <p:blipFill>
-          <a:blip r:embed="rId3"/>
-          <a:stretch>
-            <a:fillRect/>
-          </a:stretch>
-        </p:blipFill>
-        <p:spPr>
-          <a:xfrm>
-            <a:off x="7315200" y="365760"/>
-            <a:ext cx="1050029" cy="274320"/>
-          </a:xfrm>
-          <a:prstGeom prst="rect">
-            <a:avLst/>
-          </a:prstGeom>
-        </p:spPr>
-      </p:pic>
-      <p:sp>
-        <p:nvSpPr>
-          <p:cNvPr id="5" name="TextBox 4"/>
-          <p:cNvSpPr txBox="1"/>
-          <p:nvPr/>
-        </p:nvSpPr>
-        <p:spPr>
-          <a:xfrm>
-            <a:off x="457200" y="6656832"/>
-            <a:ext cx="4114800" cy="457200"/>
-          </a:xfrm>
-          <a:prstGeom prst="rect">
-            <a:avLst/>
-          </a:prstGeom>
-          <a:noFill/>
-        </p:spPr>
-        <p:txBody>
-          <a:bodyPr wrap="none">
-            <a:spAutoFit/>
-          </a:bodyPr>
-          <a:lstStyle/>
-          <a:p>
-            <a:pPr algn="l">
-              <a:defRPr sz="1000"/>
-            </a:pPr>
-            <a:r>
-              <a:t>© 2023 Taulia LLC. Confidential information. Do not distribute.</a:t>
-            </a:r>
-          </a:p>
-        </p:txBody>
-      </p:sp>
-      <p:sp>
-        <p:nvSpPr>
-          <p:cNvPr id="6" name="Rectangle 5"/>
-          <p:cNvSpPr/>
-          <p:nvPr/>
-        </p:nvSpPr>
-        <p:spPr>
-          <a:xfrm>
-            <a:off x="4572000" y="6720840"/>
-            <a:ext cx="4572000" cy="137160"/>
-          </a:xfrm>
-          <a:prstGeom prst="rect">
-            <a:avLst/>
-          </a:prstGeom>
-          <a:solidFill>
-            <a:srgbClr val="FF6600"/>
-          </a:solidFill>
-          <a:ln>
-            <a:noFill/>
-          </a:ln>
-        </p:spPr>
-        <p:style>
-          <a:lnRef idx="1">
-            <a:schemeClr val="accent1"/>
-          </a:lnRef>
-          <a:fillRef idx="3">
-            <a:schemeClr val="accent1"/>
-          </a:fillRef>
-          <a:effectRef idx="2">
-            <a:schemeClr val="accent1"/>
-          </a:effectRef>
-          <a:fontRef idx="minor">
-            <a:schemeClr val="lt1"/>
-          </a:fontRef>
-        </p:style>
-        <p:txBody>
-          <a:bodyPr rtlCol="0" anchor="ctr"/>
-          <a:lstStyle/>
-          <a:p>
-            <a:pPr algn="ctr"/>
-          </a:p>
-        </p:txBody>
-      </p:sp>
-    </p:spTree>
-  </p:cSld>
-  <p:clrMapOvr>
-    <a:masterClrMapping/>
-  </p:clrMapOvr>
-</p:sld>
-</file>
-
-<file path=ppt/slides/slide7.xml><?xml version="1.0" encoding="utf-8"?>
-<p:sld xmlns:a="http://schemas.openxmlformats.org/drawingml/2006/main" xmlns:p="http://schemas.openxmlformats.org/presentationml/2006/main" xmlns:r="http://schemas.openxmlformats.org/officeDocument/2006/relationships">
-  <p:cSld>
-    <p:spTree>
-      <p:nvGrpSpPr>
-        <p:cNvPr id="1" name=""/>
-        <p:cNvGrpSpPr/>
-        <p:nvPr/>
-      </p:nvGrpSpPr>
-      <p:grpSpPr/>
-      <p:sp>
-        <p:nvSpPr>
-          <p:cNvPr id="2" name="Title 1"/>
-          <p:cNvSpPr>
-            <a:spLocks noGrp="1"/>
-          </p:cNvSpPr>
-          <p:nvPr>
-            <p:ph type="title"/>
-          </p:nvPr>
-        </p:nvSpPr>
-        <p:spPr/>
-        <p:txBody>
-          <a:bodyPr/>
-          <a:lstStyle/>
-          <a:p>
-            <a:r>
-              <a:t>Discount Capture</a:t>
-            </a:r>
-          </a:p>
-        </p:txBody>
-      </p:sp>
-      <p:pic>
-        <p:nvPicPr>
-          <p:cNvPr id="3" name="Picture 2" descr="Discount Capture.png"/>
-          <p:cNvPicPr>
-            <a:picLocks noChangeAspect="1"/>
-          </p:cNvPicPr>
-          <p:nvPr/>
-        </p:nvPicPr>
-        <p:blipFill>
-          <a:blip r:embed="rId2"/>
-          <a:stretch>
-            <a:fillRect/>
-          </a:stretch>
-        </p:blipFill>
-        <p:spPr>
-          <a:xfrm>
-            <a:off x="914400" y="1371600"/>
-            <a:ext cx="4187568" cy="4572000"/>
-          </a:xfrm>
-          <a:prstGeom prst="rect">
-            <a:avLst/>
-          </a:prstGeom>
-        </p:spPr>
-      </p:pic>
-      <p:pic>
-        <p:nvPicPr>
-          <p:cNvPr id="4" name="Picture 3" descr="taulia-logo.png"/>
-          <p:cNvPicPr>
-            <a:picLocks noChangeAspect="1"/>
-          </p:cNvPicPr>
-          <p:nvPr/>
-        </p:nvPicPr>
-        <p:blipFill>
-          <a:blip r:embed="rId3"/>
-          <a:stretch>
-            <a:fillRect/>
-          </a:stretch>
-        </p:blipFill>
-        <p:spPr>
-          <a:xfrm>
-            <a:off x="7315200" y="365760"/>
-            <a:ext cx="1050029" cy="274320"/>
-          </a:xfrm>
-          <a:prstGeom prst="rect">
-            <a:avLst/>
-          </a:prstGeom>
-        </p:spPr>
-      </p:pic>
-      <p:sp>
-        <p:nvSpPr>
-          <p:cNvPr id="5" name="TextBox 4"/>
-          <p:cNvSpPr txBox="1"/>
-          <p:nvPr/>
-        </p:nvSpPr>
-        <p:spPr>
-          <a:xfrm>
-            <a:off x="457200" y="6656832"/>
-            <a:ext cx="4114800" cy="457200"/>
-          </a:xfrm>
-          <a:prstGeom prst="rect">
-            <a:avLst/>
-          </a:prstGeom>
-          <a:noFill/>
-        </p:spPr>
-        <p:txBody>
-          <a:bodyPr wrap="none">
-            <a:spAutoFit/>
-          </a:bodyPr>
-          <a:lstStyle/>
-          <a:p>
-            <a:pPr algn="l">
-              <a:defRPr sz="1000"/>
-            </a:pPr>
-            <a:r>
-              <a:t>© 2023 Taulia LLC. Confidential information. Do not distribute.</a:t>
-            </a:r>
-          </a:p>
-        </p:txBody>
-      </p:sp>
-      <p:sp>
-        <p:nvSpPr>
-          <p:cNvPr id="6" name="Rectangle 5"/>
-          <p:cNvSpPr/>
-          <p:nvPr/>
-        </p:nvSpPr>
-        <p:spPr>
-          <a:xfrm>
-            <a:off x="4572000" y="6720840"/>
-            <a:ext cx="4572000" cy="137160"/>
-          </a:xfrm>
-          <a:prstGeom prst="rect">
-            <a:avLst/>
-          </a:prstGeom>
-          <a:solidFill>
-            <a:srgbClr val="FF6600"/>
-          </a:solidFill>
-          <a:ln>
-            <a:noFill/>
-          </a:ln>
-        </p:spPr>
-        <p:style>
-          <a:lnRef idx="1">
-            <a:schemeClr val="accent1"/>
-          </a:lnRef>
-          <a:fillRef idx="3">
-            <a:schemeClr val="accent1"/>
-          </a:fillRef>
-          <a:effectRef idx="2">
-            <a:schemeClr val="accent1"/>
-          </a:effectRef>
-          <a:fontRef idx="minor">
-            <a:schemeClr val="lt1"/>
-          </a:fontRef>
-        </p:style>
-        <p:txBody>
-          <a:bodyPr rtlCol="0" anchor="ctr"/>
-          <a:lstStyle/>
-          <a:p>
-            <a:pPr algn="ctr"/>
-          </a:p>
-        </p:txBody>
-      </p:sp>
-    </p:spTree>
-  </p:cSld>
-  <p:clrMapOvr>
-    <a:masterClrMapping/>
-  </p:clrMapOvr>
-</p:sld>
-</file>
-
-<file path=ppt/slides/slide8.xml><?xml version="1.0" encoding="utf-8"?>
-<p:sld xmlns:a="http://schemas.openxmlformats.org/drawingml/2006/main" xmlns:p="http://schemas.openxmlformats.org/presentationml/2006/main" xmlns:r="http://schemas.openxmlformats.org/officeDocument/2006/relationships">
-  <p:cSld>
-    <p:spTree>
-      <p:nvGrpSpPr>
-        <p:cNvPr id="1" name=""/>
-        <p:cNvGrpSpPr/>
-        <p:nvPr/>
-      </p:nvGrpSpPr>
-      <p:grpSpPr/>
-      <p:sp>
-        <p:nvSpPr>
-          <p:cNvPr id="2" name="Title 1"/>
-          <p:cNvSpPr>
-            <a:spLocks noGrp="1"/>
-          </p:cNvSpPr>
-          <p:nvPr>
-            <p:ph type="title"/>
-          </p:nvPr>
-        </p:nvSpPr>
-        <p:spPr/>
-        <p:txBody>
-          <a:bodyPr/>
-          <a:lstStyle/>
-          <a:p>
-            <a:r>
-              <a:t>Payment Term Descriptions</a:t>
-            </a:r>
-          </a:p>
-        </p:txBody>
-      </p:sp>
-      <p:pic>
-        <p:nvPicPr>
-          <p:cNvPr id="3" name="Picture 2" descr="Payment Term Descriptions.png"/>
-          <p:cNvPicPr>
-            <a:picLocks noChangeAspect="1"/>
-          </p:cNvPicPr>
-          <p:nvPr/>
-        </p:nvPicPr>
-        <p:blipFill>
-          <a:blip r:embed="rId2"/>
-          <a:stretch>
-            <a:fillRect/>
-          </a:stretch>
-        </p:blipFill>
-        <p:spPr>
-          <a:xfrm>
-            <a:off x="914400" y="1371600"/>
-            <a:ext cx="4187568" cy="4572000"/>
-          </a:xfrm>
-          <a:prstGeom prst="rect">
-            <a:avLst/>
-          </a:prstGeom>
-        </p:spPr>
-      </p:pic>
-      <p:pic>
-        <p:nvPicPr>
-          <p:cNvPr id="4" name="Picture 3" descr="taulia-logo.png"/>
-          <p:cNvPicPr>
-            <a:picLocks noChangeAspect="1"/>
-          </p:cNvPicPr>
-          <p:nvPr/>
-        </p:nvPicPr>
-        <p:blipFill>
-          <a:blip r:embed="rId3"/>
-          <a:stretch>
-            <a:fillRect/>
-          </a:stretch>
-        </p:blipFill>
-        <p:spPr>
-          <a:xfrm>
-            <a:off x="7315200" y="365760"/>
-            <a:ext cx="1050029" cy="274320"/>
-          </a:xfrm>
-          <a:prstGeom prst="rect">
-            <a:avLst/>
-          </a:prstGeom>
-        </p:spPr>
-      </p:pic>
-      <p:sp>
-        <p:nvSpPr>
-          <p:cNvPr id="5" name="TextBox 4"/>
-          <p:cNvSpPr txBox="1"/>
-          <p:nvPr/>
-        </p:nvSpPr>
-        <p:spPr>
-          <a:xfrm>
-            <a:off x="457200" y="6656832"/>
-            <a:ext cx="4114800" cy="457200"/>
-          </a:xfrm>
-          <a:prstGeom prst="rect">
-            <a:avLst/>
-          </a:prstGeom>
-          <a:noFill/>
-        </p:spPr>
-        <p:txBody>
-          <a:bodyPr wrap="none">
-            <a:spAutoFit/>
-          </a:bodyPr>
-          <a:lstStyle/>
-          <a:p>
-            <a:pPr algn="l">
-              <a:defRPr sz="1000"/>
-            </a:pPr>
-            <a:r>
-              <a:t>© 2023 Taulia LLC. Confidential information. Do not distribute.</a:t>
-            </a:r>
-          </a:p>
-        </p:txBody>
-      </p:sp>
-      <p:sp>
-        <p:nvSpPr>
-          <p:cNvPr id="6" name="Rectangle 5"/>
-          <p:cNvSpPr/>
-          <p:nvPr/>
-        </p:nvSpPr>
-        <p:spPr>
-          <a:xfrm>
-            <a:off x="4572000" y="6720840"/>
-            <a:ext cx="4572000" cy="137160"/>
-          </a:xfrm>
-          <a:prstGeom prst="rect">
-            <a:avLst/>
-          </a:prstGeom>
-          <a:solidFill>
-            <a:srgbClr val="FF6600"/>
-          </a:solidFill>
-          <a:ln>
-            <a:noFill/>
-          </a:ln>
-        </p:spPr>
-        <p:style>
-          <a:lnRef idx="1">
-            <a:schemeClr val="accent1"/>
-          </a:lnRef>
-          <a:fillRef idx="3">
-            <a:schemeClr val="accent1"/>
-          </a:fillRef>
-          <a:effectRef idx="2">
-            <a:schemeClr val="accent1"/>
-          </a:effectRef>
-          <a:fontRef idx="minor">
-            <a:schemeClr val="lt1"/>
-          </a:fontRef>
-        </p:style>
-        <p:txBody>
-          <a:bodyPr rtlCol="0" anchor="ctr"/>
-          <a:lstStyle/>
-          <a:p>
-            <a:pPr algn="ctr"/>
-          </a:p>
-        </p:txBody>
-      </p:sp>
-    </p:spTree>
-  </p:cSld>
-  <p:clrMapOvr>
-    <a:masterClrMapping/>
-  </p:clrMapOvr>
-</p:sld>
-</file>
-
-<file path=ppt/slides/slide9.xml><?xml version="1.0" encoding="utf-8"?>
-<p:sld xmlns:a="http://schemas.openxmlformats.org/drawingml/2006/main" xmlns:p="http://schemas.openxmlformats.org/presentationml/2006/main" xmlns:r="http://schemas.openxmlformats.org/officeDocument/2006/relationships">
-  <p:cSld>
-    <p:spTree>
-      <p:nvGrpSpPr>
-        <p:cNvPr id="1" name=""/>
-        <p:cNvGrpSpPr/>
-        <p:nvPr/>
-      </p:nvGrpSpPr>
-      <p:grpSpPr/>
-      <p:sp>
-        <p:nvSpPr>
-          <p:cNvPr id="2" name="Title 1"/>
-          <p:cNvSpPr>
-            <a:spLocks noGrp="1"/>
-          </p:cNvSpPr>
-          <p:nvPr>
-            <p:ph type="title"/>
-          </p:nvPr>
-        </p:nvSpPr>
-        <p:spPr/>
-        <p:txBody>
-          <a:bodyPr/>
-          <a:lstStyle/>
-          <a:p>
-            <a:r>
-              <a:t>Strategic Scenarios</a:t>
-            </a:r>
-          </a:p>
-        </p:txBody>
-      </p:sp>
-      <p:pic>
-        <p:nvPicPr>
-          <p:cNvPr id="3" name="Picture 2" descr="Strategic Scenarios.png"/>
+          <p:cNvPr id="3" name="Picture 2" descr="Peer DPO.png"/>
           <p:cNvPicPr>
             <a:picLocks noChangeAspect="1"/>
           </p:cNvPicPr>

</xml_diff>